<commit_message>
first half of the the final presentation
</commit_message>
<xml_diff>
--- a/Documents/Milestone 2.pptx
+++ b/Documents/Milestone 2.pptx
@@ -6,18 +6,19 @@
   </p:sldMasterIdLst>
   <p:sldIdLst>
     <p:sldId id="256" r:id="rId2"/>
-    <p:sldId id="267" r:id="rId3"/>
-    <p:sldId id="257" r:id="rId4"/>
-    <p:sldId id="258" r:id="rId5"/>
-    <p:sldId id="259" r:id="rId6"/>
-    <p:sldId id="260" r:id="rId7"/>
-    <p:sldId id="261" r:id="rId8"/>
-    <p:sldId id="262" r:id="rId9"/>
-    <p:sldId id="263" r:id="rId10"/>
-    <p:sldId id="264" r:id="rId11"/>
-    <p:sldId id="265" r:id="rId12"/>
-    <p:sldId id="268" r:id="rId13"/>
-    <p:sldId id="266" r:id="rId14"/>
+    <p:sldId id="269" r:id="rId3"/>
+    <p:sldId id="267" r:id="rId4"/>
+    <p:sldId id="257" r:id="rId5"/>
+    <p:sldId id="258" r:id="rId6"/>
+    <p:sldId id="259" r:id="rId7"/>
+    <p:sldId id="260" r:id="rId8"/>
+    <p:sldId id="261" r:id="rId9"/>
+    <p:sldId id="262" r:id="rId10"/>
+    <p:sldId id="263" r:id="rId11"/>
+    <p:sldId id="264" r:id="rId12"/>
+    <p:sldId id="265" r:id="rId13"/>
+    <p:sldId id="268" r:id="rId14"/>
+    <p:sldId id="266" r:id="rId15"/>
   </p:sldIdLst>
   <p:sldSz cx="12192000" cy="6858000"/>
   <p:notesSz cx="6858000" cy="9144000"/>
@@ -267,7 +268,7 @@
           <a:p>
             <a:fld id="{2395C5C9-164C-46B3-A87E-7660D39D3106}" type="datetime2">
               <a:rPr lang="en-US" smtClean="0"/>
-              <a:t>Wednesday, December 18, 2024</a:t>
+              <a:t>Friday, December 20, 2024</a:t>
             </a:fld>
             <a:endParaRPr lang="en-US" dirty="0"/>
           </a:p>
@@ -470,7 +471,7 @@
           <a:p>
             <a:fld id="{5B75179A-1E2B-41AB-B400-4F1B4022FAEE}" type="datetime2">
               <a:rPr lang="en-US" smtClean="0"/>
-              <a:t>Wednesday, December 18, 2024</a:t>
+              <a:t>Friday, December 20, 2024</a:t>
             </a:fld>
             <a:endParaRPr lang="en-US"/>
           </a:p>
@@ -683,7 +684,7 @@
           <a:p>
             <a:fld id="{05681D0F-6595-4F14-8EF3-954CD87C797B}" type="datetime2">
               <a:rPr lang="en-US" smtClean="0"/>
-              <a:t>Wednesday, December 18, 2024</a:t>
+              <a:t>Friday, December 20, 2024</a:t>
             </a:fld>
             <a:endParaRPr lang="en-US"/>
           </a:p>
@@ -885,7 +886,7 @@
           <a:p>
             <a:fld id="{4DDCFF8A-AAF8-4A12-8A91-9CA0EAF6CBB9}" type="datetime2">
               <a:rPr lang="en-US" smtClean="0"/>
-              <a:t>Wednesday, December 18, 2024</a:t>
+              <a:t>Friday, December 20, 2024</a:t>
             </a:fld>
             <a:endParaRPr lang="en-US" dirty="0"/>
           </a:p>
@@ -1164,7 +1165,7 @@
           <a:p>
             <a:fld id="{ABCC25C3-021A-4B0B-8F70-0C181FE1CF45}" type="datetime2">
               <a:rPr lang="en-US" smtClean="0"/>
-              <a:t>Wednesday, December 18, 2024</a:t>
+              <a:t>Friday, December 20, 2024</a:t>
             </a:fld>
             <a:endParaRPr lang="en-US"/>
           </a:p>
@@ -1424,7 +1425,7 @@
           <a:p>
             <a:fld id="{0C23D88D-8CEC-4ED9-A53B-5596187D9A16}" type="datetime2">
               <a:rPr lang="en-US" smtClean="0"/>
-              <a:t>Wednesday, December 18, 2024</a:t>
+              <a:t>Friday, December 20, 2024</a:t>
             </a:fld>
             <a:endParaRPr lang="en-US"/>
           </a:p>
@@ -1840,7 +1841,7 @@
           <a:p>
             <a:fld id="{D2CCD382-DFDA-4722-A27A-59C21AD112F2}" type="datetime2">
               <a:rPr lang="en-US" smtClean="0"/>
-              <a:t>Wednesday, December 18, 2024</a:t>
+              <a:t>Friday, December 20, 2024</a:t>
             </a:fld>
             <a:endParaRPr lang="en-US"/>
           </a:p>
@@ -1985,7 +1986,7 @@
           <a:p>
             <a:fld id="{22F2A30D-1C09-413F-AAB1-38F366000715}" type="datetime2">
               <a:rPr lang="en-US" smtClean="0"/>
-              <a:t>Wednesday, December 18, 2024</a:t>
+              <a:t>Friday, December 20, 2024</a:t>
             </a:fld>
             <a:endParaRPr lang="en-US"/>
           </a:p>
@@ -2107,7 +2108,7 @@
           <a:p>
             <a:fld id="{6DB82B9C-D65E-4F64-95C3-B10F3B00F0D9}" type="datetime2">
               <a:rPr lang="en-US" smtClean="0"/>
-              <a:t>Wednesday, December 18, 2024</a:t>
+              <a:t>Friday, December 20, 2024</a:t>
             </a:fld>
             <a:endParaRPr lang="en-US"/>
           </a:p>
@@ -2430,7 +2431,7 @@
           <a:p>
             <a:fld id="{B7F5FDCC-6AAC-4A08-B9E0-3793AB5E64C3}" type="datetime2">
               <a:rPr lang="en-US" smtClean="0"/>
-              <a:t>Wednesday, December 18, 2024</a:t>
+              <a:t>Friday, December 20, 2024</a:t>
             </a:fld>
             <a:endParaRPr lang="en-US"/>
           </a:p>
@@ -2718,7 +2719,7 @@
           <a:p>
             <a:fld id="{349FE94D-439C-40F1-900E-BC07940E3988}" type="datetime2">
               <a:rPr lang="en-US" smtClean="0"/>
-              <a:t>Wednesday, December 18, 2024</a:t>
+              <a:t>Friday, December 20, 2024</a:t>
             </a:fld>
             <a:endParaRPr lang="en-US"/>
           </a:p>
@@ -3006,7 +3007,7 @@
           <a:p>
             <a:fld id="{8DEA2CF1-0EB2-4673-802D-3371233E4A77}" type="datetime2">
               <a:rPr lang="en-US" smtClean="0"/>
-              <a:t>Wednesday, December 18, 2024</a:t>
+              <a:t>Friday, December 20, 2024</a:t>
             </a:fld>
             <a:endParaRPr lang="en-US" dirty="0"/>
           </a:p>
@@ -3731,14 +3732,14 @@
       </p:grpSpPr>
       <p:sp>
         <p:nvSpPr>
-          <p:cNvPr id="2" name="Title 1">
+          <p:cNvPr id="3" name="Title 2">
             <a:extLst>
               <a:ext uri="{FF2B5EF4-FFF2-40B4-BE49-F238E27FC236}">
-                <a16:creationId xmlns:a16="http://schemas.microsoft.com/office/drawing/2014/main" id="{BC396729-7E16-62C4-273C-91622F24920E}"/>
+                <a16:creationId xmlns:a16="http://schemas.microsoft.com/office/drawing/2014/main" id="{4EC85AB1-F930-4123-604C-CDB423C206DC}"/>
               </a:ext>
             </a:extLst>
           </p:cNvPr>
-          <p:cNvSpPr>
+          <p:cNvSpPr txBox="1">
             <a:spLocks noGrp="1"/>
           </p:cNvSpPr>
           <p:nvPr>
@@ -3747,33 +3748,33 @@
         </p:nvSpPr>
         <p:spPr>
           <a:xfrm>
-            <a:off x="720000" y="609040"/>
-            <a:ext cx="10728322" cy="1101445"/>
-          </a:xfrm>
-        </p:spPr>
-        <p:txBody>
-          <a:bodyPr>
-            <a:normAutofit/>
+            <a:off x="720725" y="619125"/>
+            <a:ext cx="10728325" cy="276999"/>
+          </a:xfrm>
+          <a:prstGeom prst="rect">
+            <a:avLst/>
+          </a:prstGeom>
+          <a:noFill/>
+        </p:spPr>
+        <p:txBody>
+          <a:bodyPr wrap="square" rtlCol="0">
+            <a:spAutoFit/>
           </a:bodyPr>
           <a:lstStyle/>
           <a:p>
             <a:r>
               <a:rPr lang="en-US" sz="1800" dirty="0"/>
-              <a:t>Sort Existing tasks:   a) by Due dates</a:t>
-            </a:r>
-            <a:br>
-              <a:rPr lang="en-US" sz="1800" dirty="0"/>
-            </a:br>
-            <a:endParaRPr lang="en-US" sz="1800" dirty="0"/>
+              <a:t>Search for a task:    b) By Tag</a:t>
+            </a:r>
           </a:p>
         </p:txBody>
       </p:sp>
       <p:pic>
         <p:nvPicPr>
-          <p:cNvPr id="11" name="Picture 10">
+          <p:cNvPr id="8" name="Picture 7">
             <a:extLst>
               <a:ext uri="{FF2B5EF4-FFF2-40B4-BE49-F238E27FC236}">
-                <a16:creationId xmlns:a16="http://schemas.microsoft.com/office/drawing/2014/main" id="{96B3F453-5036-2B3E-34E9-76C677866F92}"/>
+                <a16:creationId xmlns:a16="http://schemas.microsoft.com/office/drawing/2014/main" id="{3F8DCB0A-F321-F94E-CEB3-3B5641EF63C6}"/>
               </a:ext>
             </a:extLst>
           </p:cNvPr>
@@ -3790,8 +3791,8 @@
         </p:blipFill>
         <p:spPr>
           <a:xfrm>
-            <a:off x="786938" y="1169922"/>
-            <a:ext cx="10618123" cy="5364236"/>
+            <a:off x="763548" y="1099324"/>
+            <a:ext cx="10685502" cy="5342751"/>
           </a:xfrm>
           <a:prstGeom prst="rect">
             <a:avLst/>
@@ -3800,10 +3801,10 @@
       </p:pic>
       <p:sp>
         <p:nvSpPr>
-          <p:cNvPr id="14" name="Rectangle 13">
+          <p:cNvPr id="9" name="Rectangle 8">
             <a:extLst>
               <a:ext uri="{FF2B5EF4-FFF2-40B4-BE49-F238E27FC236}">
-                <a16:creationId xmlns:a16="http://schemas.microsoft.com/office/drawing/2014/main" id="{B578C94F-F923-5D5B-5522-8217E58D121F}"/>
+                <a16:creationId xmlns:a16="http://schemas.microsoft.com/office/drawing/2014/main" id="{ED359CC3-4C43-1896-B4C6-93A2DD0458DC}"/>
               </a:ext>
             </a:extLst>
           </p:cNvPr>
@@ -3812,8 +3813,8 @@
         </p:nvSpPr>
         <p:spPr>
           <a:xfrm>
-            <a:off x="3403600" y="1198879"/>
-            <a:ext cx="2976880" cy="335281"/>
+            <a:off x="1818640" y="1198879"/>
+            <a:ext cx="1656080" cy="335281"/>
           </a:xfrm>
           <a:prstGeom prst="rect">
             <a:avLst/>
@@ -3850,166 +3851,10 @@
           </a:p>
         </p:txBody>
       </p:sp>
-      <p:sp>
-        <p:nvSpPr>
-          <p:cNvPr id="15" name="Rectangle 14">
-            <a:extLst>
-              <a:ext uri="{FF2B5EF4-FFF2-40B4-BE49-F238E27FC236}">
-                <a16:creationId xmlns:a16="http://schemas.microsoft.com/office/drawing/2014/main" id="{87B492FA-A1FE-9141-31CD-CFF8A75F02CA}"/>
-              </a:ext>
-            </a:extLst>
-          </p:cNvPr>
-          <p:cNvSpPr/>
-          <p:nvPr/>
-        </p:nvSpPr>
-        <p:spPr>
-          <a:xfrm>
-            <a:off x="2692400" y="2093566"/>
-            <a:ext cx="1656080" cy="335281"/>
-          </a:xfrm>
-          <a:prstGeom prst="rect">
-            <a:avLst/>
-          </a:prstGeom>
-          <a:noFill/>
-          <a:ln w="38100">
-            <a:solidFill>
-              <a:srgbClr val="FF0000"/>
-            </a:solidFill>
-          </a:ln>
-        </p:spPr>
-        <p:style>
-          <a:lnRef idx="2">
-            <a:schemeClr val="accent1">
-              <a:shade val="15000"/>
-            </a:schemeClr>
-          </a:lnRef>
-          <a:fillRef idx="1">
-            <a:schemeClr val="accent1"/>
-          </a:fillRef>
-          <a:effectRef idx="0">
-            <a:schemeClr val="accent1"/>
-          </a:effectRef>
-          <a:fontRef idx="minor">
-            <a:schemeClr val="lt1"/>
-          </a:fontRef>
-        </p:style>
-        <p:txBody>
-          <a:bodyPr rtlCol="0" anchor="ctr"/>
-          <a:lstStyle/>
-          <a:p>
-            <a:pPr algn="ctr"/>
-            <a:endParaRPr lang="en-US"/>
-          </a:p>
-        </p:txBody>
-      </p:sp>
-      <p:sp>
-        <p:nvSpPr>
-          <p:cNvPr id="16" name="Rectangle 15">
-            <a:extLst>
-              <a:ext uri="{FF2B5EF4-FFF2-40B4-BE49-F238E27FC236}">
-                <a16:creationId xmlns:a16="http://schemas.microsoft.com/office/drawing/2014/main" id="{EE21F1EC-D283-840D-EE8D-1EF1EBE653DD}"/>
-              </a:ext>
-            </a:extLst>
-          </p:cNvPr>
-          <p:cNvSpPr/>
-          <p:nvPr/>
-        </p:nvSpPr>
-        <p:spPr>
-          <a:xfrm>
-            <a:off x="2692400" y="3973501"/>
-            <a:ext cx="1656080" cy="335281"/>
-          </a:xfrm>
-          <a:prstGeom prst="rect">
-            <a:avLst/>
-          </a:prstGeom>
-          <a:noFill/>
-          <a:ln w="38100">
-            <a:solidFill>
-              <a:srgbClr val="FF0000"/>
-            </a:solidFill>
-          </a:ln>
-        </p:spPr>
-        <p:style>
-          <a:lnRef idx="2">
-            <a:schemeClr val="accent1">
-              <a:shade val="15000"/>
-            </a:schemeClr>
-          </a:lnRef>
-          <a:fillRef idx="1">
-            <a:schemeClr val="accent1"/>
-          </a:fillRef>
-          <a:effectRef idx="0">
-            <a:schemeClr val="accent1"/>
-          </a:effectRef>
-          <a:fontRef idx="minor">
-            <a:schemeClr val="lt1"/>
-          </a:fontRef>
-        </p:style>
-        <p:txBody>
-          <a:bodyPr rtlCol="0" anchor="ctr"/>
-          <a:lstStyle/>
-          <a:p>
-            <a:pPr algn="ctr"/>
-            <a:endParaRPr lang="en-US"/>
-          </a:p>
-        </p:txBody>
-      </p:sp>
-      <p:sp>
-        <p:nvSpPr>
-          <p:cNvPr id="17" name="Rectangle 16">
-            <a:extLst>
-              <a:ext uri="{FF2B5EF4-FFF2-40B4-BE49-F238E27FC236}">
-                <a16:creationId xmlns:a16="http://schemas.microsoft.com/office/drawing/2014/main" id="{77328736-B578-D933-D3B3-CB01E54C54E7}"/>
-              </a:ext>
-            </a:extLst>
-          </p:cNvPr>
-          <p:cNvSpPr/>
-          <p:nvPr/>
-        </p:nvSpPr>
-        <p:spPr>
-          <a:xfrm>
-            <a:off x="2575560" y="5772156"/>
-            <a:ext cx="1656080" cy="335281"/>
-          </a:xfrm>
-          <a:prstGeom prst="rect">
-            <a:avLst/>
-          </a:prstGeom>
-          <a:noFill/>
-          <a:ln w="38100">
-            <a:solidFill>
-              <a:srgbClr val="FF0000"/>
-            </a:solidFill>
-          </a:ln>
-        </p:spPr>
-        <p:style>
-          <a:lnRef idx="2">
-            <a:schemeClr val="accent1">
-              <a:shade val="15000"/>
-            </a:schemeClr>
-          </a:lnRef>
-          <a:fillRef idx="1">
-            <a:schemeClr val="accent1"/>
-          </a:fillRef>
-          <a:effectRef idx="0">
-            <a:schemeClr val="accent1"/>
-          </a:effectRef>
-          <a:fontRef idx="minor">
-            <a:schemeClr val="lt1"/>
-          </a:fontRef>
-        </p:style>
-        <p:txBody>
-          <a:bodyPr rtlCol="0" anchor="ctr"/>
-          <a:lstStyle/>
-          <a:p>
-            <a:pPr algn="ctr"/>
-            <a:endParaRPr lang="en-US"/>
-          </a:p>
-        </p:txBody>
-      </p:sp>
     </p:spTree>
     <p:extLst>
       <p:ext uri="{BB962C8B-B14F-4D97-AF65-F5344CB8AC3E}">
-        <p14:creationId xmlns:p14="http://schemas.microsoft.com/office/powerpoint/2010/main" val="2793346259"/>
+        <p14:creationId xmlns:p14="http://schemas.microsoft.com/office/powerpoint/2010/main" val="1111227804"/>
       </p:ext>
     </p:extLst>
   </p:cSld>
@@ -4038,6 +3883,313 @@
       </p:grpSpPr>
       <p:sp>
         <p:nvSpPr>
+          <p:cNvPr id="2" name="Title 1">
+            <a:extLst>
+              <a:ext uri="{FF2B5EF4-FFF2-40B4-BE49-F238E27FC236}">
+                <a16:creationId xmlns:a16="http://schemas.microsoft.com/office/drawing/2014/main" id="{BC396729-7E16-62C4-273C-91622F24920E}"/>
+              </a:ext>
+            </a:extLst>
+          </p:cNvPr>
+          <p:cNvSpPr>
+            <a:spLocks noGrp="1"/>
+          </p:cNvSpPr>
+          <p:nvPr>
+            <p:ph type="title"/>
+          </p:nvPr>
+        </p:nvSpPr>
+        <p:spPr>
+          <a:xfrm>
+            <a:off x="720000" y="609040"/>
+            <a:ext cx="10728322" cy="1101445"/>
+          </a:xfrm>
+        </p:spPr>
+        <p:txBody>
+          <a:bodyPr>
+            <a:normAutofit/>
+          </a:bodyPr>
+          <a:lstStyle/>
+          <a:p>
+            <a:r>
+              <a:rPr lang="en-US" sz="1800" dirty="0"/>
+              <a:t>Sort Existing tasks:   a) by Due dates</a:t>
+            </a:r>
+            <a:br>
+              <a:rPr lang="en-US" sz="1800" dirty="0"/>
+            </a:br>
+            <a:endParaRPr lang="en-US" sz="1800" dirty="0"/>
+          </a:p>
+        </p:txBody>
+      </p:sp>
+      <p:pic>
+        <p:nvPicPr>
+          <p:cNvPr id="11" name="Picture 10">
+            <a:extLst>
+              <a:ext uri="{FF2B5EF4-FFF2-40B4-BE49-F238E27FC236}">
+                <a16:creationId xmlns:a16="http://schemas.microsoft.com/office/drawing/2014/main" id="{96B3F453-5036-2B3E-34E9-76C677866F92}"/>
+              </a:ext>
+            </a:extLst>
+          </p:cNvPr>
+          <p:cNvPicPr>
+            <a:picLocks noChangeAspect="1"/>
+          </p:cNvPicPr>
+          <p:nvPr/>
+        </p:nvPicPr>
+        <p:blipFill>
+          <a:blip r:embed="rId2"/>
+          <a:stretch>
+            <a:fillRect/>
+          </a:stretch>
+        </p:blipFill>
+        <p:spPr>
+          <a:xfrm>
+            <a:off x="786938" y="1169922"/>
+            <a:ext cx="10618123" cy="5364236"/>
+          </a:xfrm>
+          <a:prstGeom prst="rect">
+            <a:avLst/>
+          </a:prstGeom>
+        </p:spPr>
+      </p:pic>
+      <p:sp>
+        <p:nvSpPr>
+          <p:cNvPr id="14" name="Rectangle 13">
+            <a:extLst>
+              <a:ext uri="{FF2B5EF4-FFF2-40B4-BE49-F238E27FC236}">
+                <a16:creationId xmlns:a16="http://schemas.microsoft.com/office/drawing/2014/main" id="{B578C94F-F923-5D5B-5522-8217E58D121F}"/>
+              </a:ext>
+            </a:extLst>
+          </p:cNvPr>
+          <p:cNvSpPr/>
+          <p:nvPr/>
+        </p:nvSpPr>
+        <p:spPr>
+          <a:xfrm>
+            <a:off x="3403600" y="1198879"/>
+            <a:ext cx="2976880" cy="335281"/>
+          </a:xfrm>
+          <a:prstGeom prst="rect">
+            <a:avLst/>
+          </a:prstGeom>
+          <a:noFill/>
+          <a:ln w="38100">
+            <a:solidFill>
+              <a:srgbClr val="FF0000"/>
+            </a:solidFill>
+          </a:ln>
+        </p:spPr>
+        <p:style>
+          <a:lnRef idx="2">
+            <a:schemeClr val="accent1">
+              <a:shade val="15000"/>
+            </a:schemeClr>
+          </a:lnRef>
+          <a:fillRef idx="1">
+            <a:schemeClr val="accent1"/>
+          </a:fillRef>
+          <a:effectRef idx="0">
+            <a:schemeClr val="accent1"/>
+          </a:effectRef>
+          <a:fontRef idx="minor">
+            <a:schemeClr val="lt1"/>
+          </a:fontRef>
+        </p:style>
+        <p:txBody>
+          <a:bodyPr rtlCol="0" anchor="ctr"/>
+          <a:lstStyle/>
+          <a:p>
+            <a:pPr algn="ctr"/>
+            <a:endParaRPr lang="en-US"/>
+          </a:p>
+        </p:txBody>
+      </p:sp>
+      <p:sp>
+        <p:nvSpPr>
+          <p:cNvPr id="15" name="Rectangle 14">
+            <a:extLst>
+              <a:ext uri="{FF2B5EF4-FFF2-40B4-BE49-F238E27FC236}">
+                <a16:creationId xmlns:a16="http://schemas.microsoft.com/office/drawing/2014/main" id="{87B492FA-A1FE-9141-31CD-CFF8A75F02CA}"/>
+              </a:ext>
+            </a:extLst>
+          </p:cNvPr>
+          <p:cNvSpPr/>
+          <p:nvPr/>
+        </p:nvSpPr>
+        <p:spPr>
+          <a:xfrm>
+            <a:off x="2692400" y="2093566"/>
+            <a:ext cx="1656080" cy="335281"/>
+          </a:xfrm>
+          <a:prstGeom prst="rect">
+            <a:avLst/>
+          </a:prstGeom>
+          <a:noFill/>
+          <a:ln w="38100">
+            <a:solidFill>
+              <a:srgbClr val="FF0000"/>
+            </a:solidFill>
+          </a:ln>
+        </p:spPr>
+        <p:style>
+          <a:lnRef idx="2">
+            <a:schemeClr val="accent1">
+              <a:shade val="15000"/>
+            </a:schemeClr>
+          </a:lnRef>
+          <a:fillRef idx="1">
+            <a:schemeClr val="accent1"/>
+          </a:fillRef>
+          <a:effectRef idx="0">
+            <a:schemeClr val="accent1"/>
+          </a:effectRef>
+          <a:fontRef idx="minor">
+            <a:schemeClr val="lt1"/>
+          </a:fontRef>
+        </p:style>
+        <p:txBody>
+          <a:bodyPr rtlCol="0" anchor="ctr"/>
+          <a:lstStyle/>
+          <a:p>
+            <a:pPr algn="ctr"/>
+            <a:endParaRPr lang="en-US"/>
+          </a:p>
+        </p:txBody>
+      </p:sp>
+      <p:sp>
+        <p:nvSpPr>
+          <p:cNvPr id="16" name="Rectangle 15">
+            <a:extLst>
+              <a:ext uri="{FF2B5EF4-FFF2-40B4-BE49-F238E27FC236}">
+                <a16:creationId xmlns:a16="http://schemas.microsoft.com/office/drawing/2014/main" id="{EE21F1EC-D283-840D-EE8D-1EF1EBE653DD}"/>
+              </a:ext>
+            </a:extLst>
+          </p:cNvPr>
+          <p:cNvSpPr/>
+          <p:nvPr/>
+        </p:nvSpPr>
+        <p:spPr>
+          <a:xfrm>
+            <a:off x="2692400" y="3973501"/>
+            <a:ext cx="1656080" cy="335281"/>
+          </a:xfrm>
+          <a:prstGeom prst="rect">
+            <a:avLst/>
+          </a:prstGeom>
+          <a:noFill/>
+          <a:ln w="38100">
+            <a:solidFill>
+              <a:srgbClr val="FF0000"/>
+            </a:solidFill>
+          </a:ln>
+        </p:spPr>
+        <p:style>
+          <a:lnRef idx="2">
+            <a:schemeClr val="accent1">
+              <a:shade val="15000"/>
+            </a:schemeClr>
+          </a:lnRef>
+          <a:fillRef idx="1">
+            <a:schemeClr val="accent1"/>
+          </a:fillRef>
+          <a:effectRef idx="0">
+            <a:schemeClr val="accent1"/>
+          </a:effectRef>
+          <a:fontRef idx="minor">
+            <a:schemeClr val="lt1"/>
+          </a:fontRef>
+        </p:style>
+        <p:txBody>
+          <a:bodyPr rtlCol="0" anchor="ctr"/>
+          <a:lstStyle/>
+          <a:p>
+            <a:pPr algn="ctr"/>
+            <a:endParaRPr lang="en-US"/>
+          </a:p>
+        </p:txBody>
+      </p:sp>
+      <p:sp>
+        <p:nvSpPr>
+          <p:cNvPr id="17" name="Rectangle 16">
+            <a:extLst>
+              <a:ext uri="{FF2B5EF4-FFF2-40B4-BE49-F238E27FC236}">
+                <a16:creationId xmlns:a16="http://schemas.microsoft.com/office/drawing/2014/main" id="{77328736-B578-D933-D3B3-CB01E54C54E7}"/>
+              </a:ext>
+            </a:extLst>
+          </p:cNvPr>
+          <p:cNvSpPr/>
+          <p:nvPr/>
+        </p:nvSpPr>
+        <p:spPr>
+          <a:xfrm>
+            <a:off x="2575560" y="5772156"/>
+            <a:ext cx="1656080" cy="335281"/>
+          </a:xfrm>
+          <a:prstGeom prst="rect">
+            <a:avLst/>
+          </a:prstGeom>
+          <a:noFill/>
+          <a:ln w="38100">
+            <a:solidFill>
+              <a:srgbClr val="FF0000"/>
+            </a:solidFill>
+          </a:ln>
+        </p:spPr>
+        <p:style>
+          <a:lnRef idx="2">
+            <a:schemeClr val="accent1">
+              <a:shade val="15000"/>
+            </a:schemeClr>
+          </a:lnRef>
+          <a:fillRef idx="1">
+            <a:schemeClr val="accent1"/>
+          </a:fillRef>
+          <a:effectRef idx="0">
+            <a:schemeClr val="accent1"/>
+          </a:effectRef>
+          <a:fontRef idx="minor">
+            <a:schemeClr val="lt1"/>
+          </a:fontRef>
+        </p:style>
+        <p:txBody>
+          <a:bodyPr rtlCol="0" anchor="ctr"/>
+          <a:lstStyle/>
+          <a:p>
+            <a:pPr algn="ctr"/>
+            <a:endParaRPr lang="en-US"/>
+          </a:p>
+        </p:txBody>
+      </p:sp>
+    </p:spTree>
+    <p:extLst>
+      <p:ext uri="{BB962C8B-B14F-4D97-AF65-F5344CB8AC3E}">
+        <p14:creationId xmlns:p14="http://schemas.microsoft.com/office/powerpoint/2010/main" val="2793346259"/>
+      </p:ext>
+    </p:extLst>
+  </p:cSld>
+  <p:clrMapOvr>
+    <a:masterClrMapping/>
+  </p:clrMapOvr>
+</p:sld>
+</file>
+
+<file path=ppt/slides/slide12.xml><?xml version="1.0" encoding="utf-8"?>
+<p:sld xmlns:a="http://schemas.openxmlformats.org/drawingml/2006/main" xmlns:r="http://schemas.openxmlformats.org/officeDocument/2006/relationships" xmlns:p="http://schemas.openxmlformats.org/presentationml/2006/main">
+  <p:cSld>
+    <p:spTree>
+      <p:nvGrpSpPr>
+        <p:cNvPr id="1" name=""/>
+        <p:cNvGrpSpPr/>
+        <p:nvPr/>
+      </p:nvGrpSpPr>
+      <p:grpSpPr>
+        <a:xfrm>
+          <a:off x="0" y="0"/>
+          <a:ext cx="0" cy="0"/>
+          <a:chOff x="0" y="0"/>
+          <a:chExt cx="0" cy="0"/>
+        </a:xfrm>
+      </p:grpSpPr>
+      <p:sp>
+        <p:nvSpPr>
           <p:cNvPr id="4" name="Title 1">
             <a:extLst>
               <a:ext uri="{FF2B5EF4-FFF2-40B4-BE49-F238E27FC236}">
@@ -4317,7 +4469,7 @@
 </p:sld>
 </file>
 
-<file path=ppt/slides/slide12.xml><?xml version="1.0" encoding="utf-8"?>
+<file path=ppt/slides/slide13.xml><?xml version="1.0" encoding="utf-8"?>
 <p:sld xmlns:a="http://schemas.openxmlformats.org/drawingml/2006/main" xmlns:r="http://schemas.openxmlformats.org/officeDocument/2006/relationships" xmlns:p="http://schemas.openxmlformats.org/presentationml/2006/main">
   <p:cSld>
     <p:spTree>
@@ -4642,7 +4794,7 @@
 </p:sld>
 </file>
 
-<file path=ppt/slides/slide13.xml><?xml version="1.0" encoding="utf-8"?>
+<file path=ppt/slides/slide14.xml><?xml version="1.0" encoding="utf-8"?>
 <p:sld xmlns:a="http://schemas.openxmlformats.org/drawingml/2006/main" xmlns:r="http://schemas.openxmlformats.org/officeDocument/2006/relationships" xmlns:p="http://schemas.openxmlformats.org/presentationml/2006/main">
   <p:cSld>
     <p:spTree>
@@ -4875,6 +5027,103 @@
 </file>
 
 <file path=ppt/slides/slide2.xml><?xml version="1.0" encoding="utf-8"?>
+<p:sld xmlns:a="http://schemas.openxmlformats.org/drawingml/2006/main" xmlns:r="http://schemas.openxmlformats.org/officeDocument/2006/relationships" xmlns:p="http://schemas.openxmlformats.org/presentationml/2006/main">
+  <p:cSld>
+    <p:spTree>
+      <p:nvGrpSpPr>
+        <p:cNvPr id="1" name=""/>
+        <p:cNvGrpSpPr/>
+        <p:nvPr/>
+      </p:nvGrpSpPr>
+      <p:grpSpPr>
+        <a:xfrm>
+          <a:off x="0" y="0"/>
+          <a:ext cx="0" cy="0"/>
+          <a:chOff x="0" y="0"/>
+          <a:chExt cx="0" cy="0"/>
+        </a:xfrm>
+      </p:grpSpPr>
+      <p:sp>
+        <p:nvSpPr>
+          <p:cNvPr id="2" name="Title 1">
+            <a:extLst>
+              <a:ext uri="{FF2B5EF4-FFF2-40B4-BE49-F238E27FC236}">
+                <a16:creationId xmlns:a16="http://schemas.microsoft.com/office/drawing/2014/main" id="{1274C2DC-26AB-1ED5-F281-D7EC2292A4A6}"/>
+              </a:ext>
+            </a:extLst>
+          </p:cNvPr>
+          <p:cNvSpPr>
+            <a:spLocks noGrp="1"/>
+          </p:cNvSpPr>
+          <p:nvPr>
+            <p:ph type="ctrTitle"/>
+          </p:nvPr>
+        </p:nvSpPr>
+        <p:spPr/>
+        <p:txBody>
+          <a:bodyPr/>
+          <a:lstStyle/>
+          <a:p>
+            <a:r>
+              <a:rPr lang="en-US" dirty="0"/>
+              <a:t>GOAL OF THE MILESTONE</a:t>
+            </a:r>
+          </a:p>
+        </p:txBody>
+      </p:sp>
+      <p:sp>
+        <p:nvSpPr>
+          <p:cNvPr id="3" name="Subtitle 2">
+            <a:extLst>
+              <a:ext uri="{FF2B5EF4-FFF2-40B4-BE49-F238E27FC236}">
+                <a16:creationId xmlns:a16="http://schemas.microsoft.com/office/drawing/2014/main" id="{B6661315-BB3D-0BDF-7632-7BC0E6ABBC21}"/>
+              </a:ext>
+            </a:extLst>
+          </p:cNvPr>
+          <p:cNvSpPr>
+            <a:spLocks noGrp="1"/>
+          </p:cNvSpPr>
+          <p:nvPr>
+            <p:ph type="subTitle" idx="1"/>
+          </p:nvPr>
+        </p:nvSpPr>
+        <p:spPr/>
+        <p:txBody>
+          <a:bodyPr/>
+          <a:lstStyle/>
+          <a:p>
+            <a:r>
+              <a:rPr lang="en-US" sz="2800" kern="100" dirty="0">
+                <a:effectLst/>
+              </a:rPr>
+              <a:t>Creation of the app storing system and fully functioned main page (Task Tab)</a:t>
+            </a:r>
+            <a:endParaRPr lang="en-US" sz="2400" kern="100" dirty="0">
+              <a:effectLst/>
+              <a:latin typeface="Aptos" panose="020B0004020202020204" pitchFamily="34" charset="0"/>
+              <a:ea typeface="Aptos" panose="020B0004020202020204" pitchFamily="34" charset="0"/>
+              <a:cs typeface="Arial" panose="020B0604020202020204" pitchFamily="34" charset="0"/>
+            </a:endParaRPr>
+          </a:p>
+          <a:p>
+            <a:endParaRPr lang="en-US" dirty="0"/>
+          </a:p>
+        </p:txBody>
+      </p:sp>
+    </p:spTree>
+    <p:extLst>
+      <p:ext uri="{BB962C8B-B14F-4D97-AF65-F5344CB8AC3E}">
+        <p14:creationId xmlns:p14="http://schemas.microsoft.com/office/powerpoint/2010/main" val="2032196931"/>
+      </p:ext>
+    </p:extLst>
+  </p:cSld>
+  <p:clrMapOvr>
+    <a:masterClrMapping/>
+  </p:clrMapOvr>
+</p:sld>
+</file>
+
+<file path=ppt/slides/slide3.xml><?xml version="1.0" encoding="utf-8"?>
 <p:sld xmlns:a="http://schemas.openxmlformats.org/drawingml/2006/main" xmlns:r="http://schemas.openxmlformats.org/officeDocument/2006/relationships" xmlns:p="http://schemas.openxmlformats.org/presentationml/2006/main">
   <p:cSld>
     <p:spTree>
@@ -5220,7 +5469,7 @@
 </p:sld>
 </file>
 
-<file path=ppt/slides/slide3.xml><?xml version="1.0" encoding="utf-8"?>
+<file path=ppt/slides/slide4.xml><?xml version="1.0" encoding="utf-8"?>
 <p:sld xmlns:a="http://schemas.openxmlformats.org/drawingml/2006/main" xmlns:r="http://schemas.openxmlformats.org/officeDocument/2006/relationships" xmlns:p="http://schemas.openxmlformats.org/presentationml/2006/main">
   <p:cSld>
     <p:spTree>
@@ -5315,7 +5564,7 @@
 </p:sld>
 </file>
 
-<file path=ppt/slides/slide4.xml><?xml version="1.0" encoding="utf-8"?>
+<file path=ppt/slides/slide5.xml><?xml version="1.0" encoding="utf-8"?>
 <p:sld xmlns:a="http://schemas.openxmlformats.org/drawingml/2006/main" xmlns:r="http://schemas.openxmlformats.org/officeDocument/2006/relationships" xmlns:p="http://schemas.openxmlformats.org/presentationml/2006/main">
   <p:cSld>
     <p:spTree>
@@ -5614,7 +5863,7 @@
 </p:sld>
 </file>
 
-<file path=ppt/slides/slide5.xml><?xml version="1.0" encoding="utf-8"?>
+<file path=ppt/slides/slide6.xml><?xml version="1.0" encoding="utf-8"?>
 <p:sld xmlns:a="http://schemas.openxmlformats.org/drawingml/2006/main" xmlns:r="http://schemas.openxmlformats.org/officeDocument/2006/relationships" xmlns:p="http://schemas.openxmlformats.org/presentationml/2006/main">
   <p:cSld>
     <p:spTree>
@@ -6058,7 +6307,7 @@
 </p:sld>
 </file>
 
-<file path=ppt/slides/slide6.xml><?xml version="1.0" encoding="utf-8"?>
+<file path=ppt/slides/slide7.xml><?xml version="1.0" encoding="utf-8"?>
 <p:sld xmlns:a="http://schemas.openxmlformats.org/drawingml/2006/main" xmlns:r="http://schemas.openxmlformats.org/officeDocument/2006/relationships" xmlns:p="http://schemas.openxmlformats.org/presentationml/2006/main">
   <p:cSld>
     <p:spTree>
@@ -6300,7 +6549,7 @@
 </p:sld>
 </file>
 
-<file path=ppt/slides/slide7.xml><?xml version="1.0" encoding="utf-8"?>
+<file path=ppt/slides/slide8.xml><?xml version="1.0" encoding="utf-8"?>
 <p:sld xmlns:a="http://schemas.openxmlformats.org/drawingml/2006/main" xmlns:r="http://schemas.openxmlformats.org/officeDocument/2006/relationships" xmlns:p="http://schemas.openxmlformats.org/presentationml/2006/main">
   <p:cSld>
     <p:spTree>
@@ -6543,7 +6792,7 @@
 </p:sld>
 </file>
 
-<file path=ppt/slides/slide8.xml><?xml version="1.0" encoding="utf-8"?>
+<file path=ppt/slides/slide9.xml><?xml version="1.0" encoding="utf-8"?>
 <p:sld xmlns:a="http://schemas.openxmlformats.org/drawingml/2006/main" xmlns:r="http://schemas.openxmlformats.org/officeDocument/2006/relationships" xmlns:p="http://schemas.openxmlformats.org/presentationml/2006/main">
   <p:cSld>
     <p:spTree>
@@ -6683,157 +6932,6 @@
     <p:extLst>
       <p:ext uri="{BB962C8B-B14F-4D97-AF65-F5344CB8AC3E}">
         <p14:creationId xmlns:p14="http://schemas.microsoft.com/office/powerpoint/2010/main" val="2122181356"/>
-      </p:ext>
-    </p:extLst>
-  </p:cSld>
-  <p:clrMapOvr>
-    <a:masterClrMapping/>
-  </p:clrMapOvr>
-</p:sld>
-</file>
-
-<file path=ppt/slides/slide9.xml><?xml version="1.0" encoding="utf-8"?>
-<p:sld xmlns:a="http://schemas.openxmlformats.org/drawingml/2006/main" xmlns:r="http://schemas.openxmlformats.org/officeDocument/2006/relationships" xmlns:p="http://schemas.openxmlformats.org/presentationml/2006/main">
-  <p:cSld>
-    <p:spTree>
-      <p:nvGrpSpPr>
-        <p:cNvPr id="1" name=""/>
-        <p:cNvGrpSpPr/>
-        <p:nvPr/>
-      </p:nvGrpSpPr>
-      <p:grpSpPr>
-        <a:xfrm>
-          <a:off x="0" y="0"/>
-          <a:ext cx="0" cy="0"/>
-          <a:chOff x="0" y="0"/>
-          <a:chExt cx="0" cy="0"/>
-        </a:xfrm>
-      </p:grpSpPr>
-      <p:sp>
-        <p:nvSpPr>
-          <p:cNvPr id="3" name="Title 2">
-            <a:extLst>
-              <a:ext uri="{FF2B5EF4-FFF2-40B4-BE49-F238E27FC236}">
-                <a16:creationId xmlns:a16="http://schemas.microsoft.com/office/drawing/2014/main" id="{4EC85AB1-F930-4123-604C-CDB423C206DC}"/>
-              </a:ext>
-            </a:extLst>
-          </p:cNvPr>
-          <p:cNvSpPr txBox="1">
-            <a:spLocks noGrp="1"/>
-          </p:cNvSpPr>
-          <p:nvPr>
-            <p:ph type="title"/>
-          </p:nvPr>
-        </p:nvSpPr>
-        <p:spPr>
-          <a:xfrm>
-            <a:off x="720725" y="619125"/>
-            <a:ext cx="10728325" cy="276999"/>
-          </a:xfrm>
-          <a:prstGeom prst="rect">
-            <a:avLst/>
-          </a:prstGeom>
-          <a:noFill/>
-        </p:spPr>
-        <p:txBody>
-          <a:bodyPr wrap="square" rtlCol="0">
-            <a:spAutoFit/>
-          </a:bodyPr>
-          <a:lstStyle/>
-          <a:p>
-            <a:r>
-              <a:rPr lang="en-US" sz="1800" dirty="0"/>
-              <a:t>Search for a task:    b) By Tag</a:t>
-            </a:r>
-          </a:p>
-        </p:txBody>
-      </p:sp>
-      <p:pic>
-        <p:nvPicPr>
-          <p:cNvPr id="8" name="Picture 7">
-            <a:extLst>
-              <a:ext uri="{FF2B5EF4-FFF2-40B4-BE49-F238E27FC236}">
-                <a16:creationId xmlns:a16="http://schemas.microsoft.com/office/drawing/2014/main" id="{3F8DCB0A-F321-F94E-CEB3-3B5641EF63C6}"/>
-              </a:ext>
-            </a:extLst>
-          </p:cNvPr>
-          <p:cNvPicPr>
-            <a:picLocks noChangeAspect="1"/>
-          </p:cNvPicPr>
-          <p:nvPr/>
-        </p:nvPicPr>
-        <p:blipFill>
-          <a:blip r:embed="rId2"/>
-          <a:stretch>
-            <a:fillRect/>
-          </a:stretch>
-        </p:blipFill>
-        <p:spPr>
-          <a:xfrm>
-            <a:off x="763548" y="1099324"/>
-            <a:ext cx="10685502" cy="5342751"/>
-          </a:xfrm>
-          <a:prstGeom prst="rect">
-            <a:avLst/>
-          </a:prstGeom>
-        </p:spPr>
-      </p:pic>
-      <p:sp>
-        <p:nvSpPr>
-          <p:cNvPr id="9" name="Rectangle 8">
-            <a:extLst>
-              <a:ext uri="{FF2B5EF4-FFF2-40B4-BE49-F238E27FC236}">
-                <a16:creationId xmlns:a16="http://schemas.microsoft.com/office/drawing/2014/main" id="{ED359CC3-4C43-1896-B4C6-93A2DD0458DC}"/>
-              </a:ext>
-            </a:extLst>
-          </p:cNvPr>
-          <p:cNvSpPr/>
-          <p:nvPr/>
-        </p:nvSpPr>
-        <p:spPr>
-          <a:xfrm>
-            <a:off x="1818640" y="1198879"/>
-            <a:ext cx="1656080" cy="335281"/>
-          </a:xfrm>
-          <a:prstGeom prst="rect">
-            <a:avLst/>
-          </a:prstGeom>
-          <a:noFill/>
-          <a:ln w="38100">
-            <a:solidFill>
-              <a:srgbClr val="FF0000"/>
-            </a:solidFill>
-          </a:ln>
-        </p:spPr>
-        <p:style>
-          <a:lnRef idx="2">
-            <a:schemeClr val="accent1">
-              <a:shade val="15000"/>
-            </a:schemeClr>
-          </a:lnRef>
-          <a:fillRef idx="1">
-            <a:schemeClr val="accent1"/>
-          </a:fillRef>
-          <a:effectRef idx="0">
-            <a:schemeClr val="accent1"/>
-          </a:effectRef>
-          <a:fontRef idx="minor">
-            <a:schemeClr val="lt1"/>
-          </a:fontRef>
-        </p:style>
-        <p:txBody>
-          <a:bodyPr rtlCol="0" anchor="ctr"/>
-          <a:lstStyle/>
-          <a:p>
-            <a:pPr algn="ctr"/>
-            <a:endParaRPr lang="en-US"/>
-          </a:p>
-        </p:txBody>
-      </p:sp>
-    </p:spTree>
-    <p:extLst>
-      <p:ext uri="{BB962C8B-B14F-4D97-AF65-F5344CB8AC3E}">
-        <p14:creationId xmlns:p14="http://schemas.microsoft.com/office/powerpoint/2010/main" val="1111227804"/>
       </p:ext>
     </p:extLst>
   </p:cSld>

</xml_diff>